<commit_message>
Eclipse에서 Client, Server App을 JAR 파일로 Export함
</commit_message>
<xml_diff>
--- a/StrangeChat_PPT.pptx
+++ b/StrangeChat_PPT.pptx
@@ -11,6 +11,7 @@
     <p:sldId id="259" r:id="rId5"/>
     <p:sldId id="260" r:id="rId6"/>
     <p:sldId id="261" r:id="rId7"/>
+    <p:sldId id="262" r:id="rId8"/>
   </p:sldIdLst>
   <p:sldSz cx="12192000" cy="6858000"/>
   <p:notesSz cx="6858000" cy="9144000"/>
@@ -120,7 +121,7 @@
 <file path=ppt/revisionInfo.xml><?xml version="1.0" encoding="utf-8"?>
 <p1510:revInfo xmlns:a="http://schemas.openxmlformats.org/drawingml/2006/main" xmlns:r="http://schemas.openxmlformats.org/officeDocument/2006/relationships" xmlns:p1510="http://schemas.microsoft.com/office/powerpoint/2015/10/main">
   <p1510:revLst>
-    <p1510:client id="{5725AB2F-871E-4B50-9AC9-36107E3A852E}" v="461" dt="2023-11-22T05:32:30.861"/>
+    <p1510:client id="{5725AB2F-871E-4B50-9AC9-36107E3A852E}" v="501" dt="2023-11-22T12:07:01.683"/>
   </p1510:revLst>
 </p1510:revInfo>
 </file>
@@ -130,7 +131,7 @@
   <pc:docChgLst>
     <pc:chgData name="수영 김" userId="78f2ecea5f65f696" providerId="LiveId" clId="{5725AB2F-871E-4B50-9AC9-36107E3A852E}"/>
     <pc:docChg chg="undo custSel addSld delSld modSld addMainMaster delMainMaster">
-      <pc:chgData name="수영 김" userId="78f2ecea5f65f696" providerId="LiveId" clId="{5725AB2F-871E-4B50-9AC9-36107E3A852E}" dt="2023-11-22T05:32:30.876" v="3049" actId="20577"/>
+      <pc:chgData name="수영 김" userId="78f2ecea5f65f696" providerId="LiveId" clId="{5725AB2F-871E-4B50-9AC9-36107E3A852E}" dt="2023-11-22T12:07:01.723" v="3150" actId="20577"/>
       <pc:docMkLst>
         <pc:docMk/>
       </pc:docMkLst>
@@ -340,7 +341,7 @@
         </pc:spChg>
       </pc:sldChg>
       <pc:sldChg chg="addSp delSp modSp new mod">
-        <pc:chgData name="수영 김" userId="78f2ecea5f65f696" providerId="LiveId" clId="{5725AB2F-871E-4B50-9AC9-36107E3A852E}" dt="2023-11-22T05:27:45.085" v="2841" actId="20577"/>
+        <pc:chgData name="수영 김" userId="78f2ecea5f65f696" providerId="LiveId" clId="{5725AB2F-871E-4B50-9AC9-36107E3A852E}" dt="2023-11-22T08:56:32.672" v="3058" actId="207"/>
         <pc:sldMkLst>
           <pc:docMk/>
           <pc:sldMk cId="2791299118" sldId="258"/>
@@ -362,7 +363,7 @@
           </ac:spMkLst>
         </pc:spChg>
         <pc:spChg chg="add mod">
-          <ac:chgData name="수영 김" userId="78f2ecea5f65f696" providerId="LiveId" clId="{5725AB2F-871E-4B50-9AC9-36107E3A852E}" dt="2023-11-18T00:01:16.658" v="1350" actId="2711"/>
+          <ac:chgData name="수영 김" userId="78f2ecea5f65f696" providerId="LiveId" clId="{5725AB2F-871E-4B50-9AC9-36107E3A852E}" dt="2023-11-22T08:56:32.672" v="3058" actId="207"/>
           <ac:spMkLst>
             <pc:docMk/>
             <pc:sldMk cId="2791299118" sldId="258"/>
@@ -649,7 +650,7 @@
         </pc:picChg>
       </pc:sldChg>
       <pc:sldChg chg="addSp modSp new mod">
-        <pc:chgData name="수영 김" userId="78f2ecea5f65f696" providerId="LiveId" clId="{5725AB2F-871E-4B50-9AC9-36107E3A852E}" dt="2023-11-22T05:32:30.876" v="3049" actId="20577"/>
+        <pc:chgData name="수영 김" userId="78f2ecea5f65f696" providerId="LiveId" clId="{5725AB2F-871E-4B50-9AC9-36107E3A852E}" dt="2023-11-22T12:07:01.723" v="3150" actId="20577"/>
         <pc:sldMkLst>
           <pc:docMk/>
           <pc:sldMk cId="3007536971" sldId="261"/>
@@ -670,6 +671,61 @@
             <ac:graphicFrameMk id="2" creationId="{51EEA891-DF50-32CA-F4A6-B08AF4BEC259}"/>
           </ac:graphicFrameMkLst>
         </pc:graphicFrameChg>
+        <pc:graphicFrameChg chg="add mod modGraphic">
+          <ac:chgData name="수영 김" userId="78f2ecea5f65f696" providerId="LiveId" clId="{5725AB2F-871E-4B50-9AC9-36107E3A852E}" dt="2023-11-22T12:07:01.723" v="3150" actId="20577"/>
+          <ac:graphicFrameMkLst>
+            <pc:docMk/>
+            <pc:sldMk cId="3007536971" sldId="261"/>
+            <ac:graphicFrameMk id="4" creationId="{3BE18AF0-0BF4-A7D8-AE29-04D4207614A1}"/>
+          </ac:graphicFrameMkLst>
+        </pc:graphicFrameChg>
+        <pc:picChg chg="add mod">
+          <ac:chgData name="수영 김" userId="78f2ecea5f65f696" providerId="LiveId" clId="{5725AB2F-871E-4B50-9AC9-36107E3A852E}" dt="2023-11-22T12:05:42.025" v="3084" actId="1076"/>
+          <ac:picMkLst>
+            <pc:docMk/>
+            <pc:sldMk cId="3007536971" sldId="261"/>
+            <ac:picMk id="1026" creationId="{3EA42FC3-A1F6-9320-256C-AE4FDC063D1E}"/>
+          </ac:picMkLst>
+        </pc:picChg>
+        <pc:picChg chg="add mod">
+          <ac:chgData name="수영 김" userId="78f2ecea5f65f696" providerId="LiveId" clId="{5725AB2F-871E-4B50-9AC9-36107E3A852E}" dt="2023-11-22T12:05:42.025" v="3084" actId="1076"/>
+          <ac:picMkLst>
+            <pc:docMk/>
+            <pc:sldMk cId="3007536971" sldId="261"/>
+            <ac:picMk id="1028" creationId="{D4E59722-CA26-BE2E-1D1E-9515864A2941}"/>
+          </ac:picMkLst>
+        </pc:picChg>
+        <pc:picChg chg="add mod">
+          <ac:chgData name="수영 김" userId="78f2ecea5f65f696" providerId="LiveId" clId="{5725AB2F-871E-4B50-9AC9-36107E3A852E}" dt="2023-11-22T12:05:42.025" v="3084" actId="1076"/>
+          <ac:picMkLst>
+            <pc:docMk/>
+            <pc:sldMk cId="3007536971" sldId="261"/>
+            <ac:picMk id="1030" creationId="{D25EC93E-0063-7166-B7DE-0263D5AD6C60}"/>
+          </ac:picMkLst>
+        </pc:picChg>
+      </pc:sldChg>
+      <pc:sldChg chg="addSp delSp modSp new mod">
+        <pc:chgData name="수영 김" userId="78f2ecea5f65f696" providerId="LiveId" clId="{5725AB2F-871E-4B50-9AC9-36107E3A852E}" dt="2023-11-22T08:54:58.025" v="3057"/>
+        <pc:sldMkLst>
+          <pc:docMk/>
+          <pc:sldMk cId="1255980416" sldId="262"/>
+        </pc:sldMkLst>
+        <pc:graphicFrameChg chg="add mod">
+          <ac:chgData name="수영 김" userId="78f2ecea5f65f696" providerId="LiveId" clId="{5725AB2F-871E-4B50-9AC9-36107E3A852E}" dt="2023-11-22T08:54:58.025" v="3057"/>
+          <ac:graphicFrameMkLst>
+            <pc:docMk/>
+            <pc:sldMk cId="1255980416" sldId="262"/>
+            <ac:graphicFrameMk id="4" creationId="{291F5426-E872-40B8-F03C-AA8EFB8C660A}"/>
+          </ac:graphicFrameMkLst>
+        </pc:graphicFrameChg>
+        <pc:picChg chg="add del">
+          <ac:chgData name="수영 김" userId="78f2ecea5f65f696" providerId="LiveId" clId="{5725AB2F-871E-4B50-9AC9-36107E3A852E}" dt="2023-11-22T08:54:54.024" v="3056" actId="22"/>
+          <ac:picMkLst>
+            <pc:docMk/>
+            <pc:sldMk cId="1255980416" sldId="262"/>
+            <ac:picMk id="3" creationId="{BB94BD17-DD10-357D-BE2C-0A0F1F53700D}"/>
+          </ac:picMkLst>
+        </pc:picChg>
       </pc:sldChg>
       <pc:sldMasterChg chg="del delSldLayout">
         <pc:chgData name="수영 김" userId="78f2ecea5f65f696" providerId="LiveId" clId="{5725AB2F-871E-4B50-9AC9-36107E3A852E}" dt="2023-11-17T23:07:56.226" v="139" actId="26606"/>
@@ -16649,10 +16705,875 @@
           </a:p>
         </p:txBody>
       </p:sp>
+      <p:pic>
+        <p:nvPicPr>
+          <p:cNvPr id="1026" name="Picture 2" descr="Save file - Free arrows icons">
+            <a:extLst>
+              <a:ext uri="{FF2B5EF4-FFF2-40B4-BE49-F238E27FC236}">
+                <a16:creationId xmlns:a16="http://schemas.microsoft.com/office/drawing/2014/main" id="{3EA42FC3-A1F6-9320-256C-AE4FDC063D1E}"/>
+              </a:ext>
+            </a:extLst>
+          </p:cNvPr>
+          <p:cNvPicPr>
+            <a:picLocks noChangeAspect="1" noChangeArrowheads="1"/>
+          </p:cNvPicPr>
+          <p:nvPr/>
+        </p:nvPicPr>
+        <p:blipFill>
+          <a:blip r:embed="rId2">
+            <a:extLst>
+              <a:ext uri="{28A0092B-C50C-407E-A947-70E740481C1C}">
+                <a14:useLocalDpi xmlns:a14="http://schemas.microsoft.com/office/drawing/2010/main" val="0"/>
+              </a:ext>
+            </a:extLst>
+          </a:blip>
+          <a:srcRect/>
+          <a:stretch>
+            <a:fillRect/>
+          </a:stretch>
+        </p:blipFill>
+        <p:spPr bwMode="auto">
+          <a:xfrm>
+            <a:off x="1606317" y="1801535"/>
+            <a:ext cx="1879134" cy="1879134"/>
+          </a:xfrm>
+          <a:prstGeom prst="rect">
+            <a:avLst/>
+          </a:prstGeom>
+          <a:noFill/>
+          <a:extLst>
+            <a:ext uri="{909E8E84-426E-40DD-AFC4-6F175D3DCCD1}">
+              <a14:hiddenFill xmlns:a14="http://schemas.microsoft.com/office/drawing/2010/main">
+                <a:solidFill>
+                  <a:srgbClr val="FFFFFF"/>
+                </a:solidFill>
+              </a14:hiddenFill>
+            </a:ext>
+          </a:extLst>
+        </p:spPr>
+      </p:pic>
+      <p:pic>
+        <p:nvPicPr>
+          <p:cNvPr id="1028" name="Picture 4" descr="Interface - Free computer icons">
+            <a:extLst>
+              <a:ext uri="{FF2B5EF4-FFF2-40B4-BE49-F238E27FC236}">
+                <a16:creationId xmlns:a16="http://schemas.microsoft.com/office/drawing/2014/main" id="{D4E59722-CA26-BE2E-1D1E-9515864A2941}"/>
+              </a:ext>
+            </a:extLst>
+          </p:cNvPr>
+          <p:cNvPicPr>
+            <a:picLocks noChangeAspect="1" noChangeArrowheads="1"/>
+          </p:cNvPicPr>
+          <p:nvPr/>
+        </p:nvPicPr>
+        <p:blipFill>
+          <a:blip r:embed="rId3">
+            <a:extLst>
+              <a:ext uri="{28A0092B-C50C-407E-A947-70E740481C1C}">
+                <a14:useLocalDpi xmlns:a14="http://schemas.microsoft.com/office/drawing/2010/main" val="0"/>
+              </a:ext>
+            </a:extLst>
+          </a:blip>
+          <a:srcRect/>
+          <a:stretch>
+            <a:fillRect/>
+          </a:stretch>
+        </p:blipFill>
+        <p:spPr bwMode="auto">
+          <a:xfrm>
+            <a:off x="5200385" y="1964265"/>
+            <a:ext cx="1709257" cy="1709257"/>
+          </a:xfrm>
+          <a:prstGeom prst="rect">
+            <a:avLst/>
+          </a:prstGeom>
+          <a:noFill/>
+          <a:extLst>
+            <a:ext uri="{909E8E84-426E-40DD-AFC4-6F175D3DCCD1}">
+              <a14:hiddenFill xmlns:a14="http://schemas.microsoft.com/office/drawing/2010/main">
+                <a:solidFill>
+                  <a:srgbClr val="FFFFFF"/>
+                </a:solidFill>
+              </a14:hiddenFill>
+            </a:ext>
+          </a:extLst>
+        </p:spPr>
+      </p:pic>
+      <p:pic>
+        <p:nvPicPr>
+          <p:cNvPr id="1030" name="Picture 6" descr="Command window - Free computer icons">
+            <a:extLst>
+              <a:ext uri="{FF2B5EF4-FFF2-40B4-BE49-F238E27FC236}">
+                <a16:creationId xmlns:a16="http://schemas.microsoft.com/office/drawing/2014/main" id="{D25EC93E-0063-7166-B7DE-0263D5AD6C60}"/>
+              </a:ext>
+            </a:extLst>
+          </p:cNvPr>
+          <p:cNvPicPr>
+            <a:picLocks noChangeAspect="1" noChangeArrowheads="1"/>
+          </p:cNvPicPr>
+          <p:nvPr/>
+        </p:nvPicPr>
+        <p:blipFill>
+          <a:blip r:embed="rId4">
+            <a:extLst>
+              <a:ext uri="{28A0092B-C50C-407E-A947-70E740481C1C}">
+                <a14:useLocalDpi xmlns:a14="http://schemas.microsoft.com/office/drawing/2010/main" val="0"/>
+              </a:ext>
+            </a:extLst>
+          </a:blip>
+          <a:srcRect/>
+          <a:stretch>
+            <a:fillRect/>
+          </a:stretch>
+        </p:blipFill>
+        <p:spPr bwMode="auto">
+          <a:xfrm>
+            <a:off x="8796553" y="1971412"/>
+            <a:ext cx="1709257" cy="1709257"/>
+          </a:xfrm>
+          <a:prstGeom prst="rect">
+            <a:avLst/>
+          </a:prstGeom>
+          <a:noFill/>
+          <a:extLst>
+            <a:ext uri="{909E8E84-426E-40DD-AFC4-6F175D3DCCD1}">
+              <a14:hiddenFill xmlns:a14="http://schemas.microsoft.com/office/drawing/2010/main">
+                <a:solidFill>
+                  <a:srgbClr val="FFFFFF"/>
+                </a:solidFill>
+              </a14:hiddenFill>
+            </a:ext>
+          </a:extLst>
+        </p:spPr>
+      </p:pic>
+      <p:graphicFrame>
+        <p:nvGraphicFramePr>
+          <p:cNvPr id="4" name="표 3">
+            <a:extLst>
+              <a:ext uri="{FF2B5EF4-FFF2-40B4-BE49-F238E27FC236}">
+                <a16:creationId xmlns:a16="http://schemas.microsoft.com/office/drawing/2014/main" id="{3BE18AF0-0BF4-A7D8-AE29-04D4207614A1}"/>
+              </a:ext>
+            </a:extLst>
+          </p:cNvPr>
+          <p:cNvGraphicFramePr>
+            <a:graphicFrameLocks noGrp="1"/>
+          </p:cNvGraphicFramePr>
+          <p:nvPr>
+            <p:extLst>
+              <p:ext uri="{D42A27DB-BD31-4B8C-83A1-F6EECF244321}">
+                <p14:modId xmlns:p14="http://schemas.microsoft.com/office/powerpoint/2010/main" val="3714146038"/>
+              </p:ext>
+            </p:extLst>
+          </p:nvPr>
+        </p:nvGraphicFramePr>
+        <p:xfrm>
+          <a:off x="755010" y="4061524"/>
+          <a:ext cx="10360404" cy="914400"/>
+        </p:xfrm>
+        <a:graphic>
+          <a:graphicData uri="http://schemas.openxmlformats.org/drawingml/2006/table">
+            <a:tbl>
+              <a:tblPr firstRow="1" bandRow="1">
+                <a:tableStyleId>{5C22544A-7EE6-4342-B048-85BDC9FD1C3A}</a:tableStyleId>
+              </a:tblPr>
+              <a:tblGrid>
+                <a:gridCol w="3453468">
+                  <a:extLst>
+                    <a:ext uri="{9D8B030D-6E8A-4147-A177-3AD203B41FA5}">
+                      <a16:colId xmlns:a16="http://schemas.microsoft.com/office/drawing/2014/main" val="4178075643"/>
+                    </a:ext>
+                  </a:extLst>
+                </a:gridCol>
+                <a:gridCol w="3453468">
+                  <a:extLst>
+                    <a:ext uri="{9D8B030D-6E8A-4147-A177-3AD203B41FA5}">
+                      <a16:colId xmlns:a16="http://schemas.microsoft.com/office/drawing/2014/main" val="2599883924"/>
+                    </a:ext>
+                  </a:extLst>
+                </a:gridCol>
+                <a:gridCol w="3453468">
+                  <a:extLst>
+                    <a:ext uri="{9D8B030D-6E8A-4147-A177-3AD203B41FA5}">
+                      <a16:colId xmlns:a16="http://schemas.microsoft.com/office/drawing/2014/main" val="2289383632"/>
+                    </a:ext>
+                  </a:extLst>
+                </a:gridCol>
+              </a:tblGrid>
+              <a:tr h="441408">
+                <a:tc>
+                  <a:txBody>
+                    <a:bodyPr/>
+                    <a:lstStyle/>
+                    <a:p>
+                      <a:pPr marL="0" marR="0" lvl="0" indent="0" algn="ctr" defTabSz="914400" rtl="0" eaLnBrk="1" fontAlgn="auto" latinLnBrk="1" hangingPunct="1">
+                        <a:lnSpc>
+                          <a:spcPct val="100000"/>
+                        </a:lnSpc>
+                        <a:spcBef>
+                          <a:spcPts val="0"/>
+                        </a:spcBef>
+                        <a:spcAft>
+                          <a:spcPts val="0"/>
+                        </a:spcAft>
+                        <a:buClrTx/>
+                        <a:buSzTx/>
+                        <a:buFontTx/>
+                        <a:buNone/>
+                        <a:tabLst/>
+                        <a:defRPr/>
+                      </a:pPr>
+                      <a:r>
+                        <a:rPr lang="ko-KR" altLang="en-US" sz="2400" b="0" dirty="0">
+                          <a:solidFill>
+                            <a:schemeClr val="tx1"/>
+                          </a:solidFill>
+                          <a:latin typeface="Noto Sans CJK KR Bold" panose="020B0800000000000000" pitchFamily="34" charset="-127"/>
+                          <a:ea typeface="Noto Sans CJK KR Bold" panose="020B0800000000000000" pitchFamily="34" charset="-127"/>
+                        </a:rPr>
+                        <a:t>파일  입출력</a:t>
+                      </a:r>
+                    </a:p>
+                  </a:txBody>
+                  <a:tcPr>
+                    <a:lnL w="12700" cmpd="sng">
+                      <a:noFill/>
+                    </a:lnL>
+                    <a:lnR w="28575" cap="flat" cmpd="sng" algn="ctr">
+                      <a:solidFill>
+                        <a:srgbClr val="E4650E"/>
+                      </a:solidFill>
+                      <a:prstDash val="solid"/>
+                      <a:round/>
+                      <a:headEnd type="none" w="med" len="med"/>
+                      <a:tailEnd type="none" w="med" len="med"/>
+                    </a:lnR>
+                    <a:lnT w="12700" cmpd="sng">
+                      <a:noFill/>
+                    </a:lnT>
+                    <a:lnB w="38100" cmpd="sng">
+                      <a:noFill/>
+                    </a:lnB>
+                    <a:lnTlToBr w="12700" cmpd="sng">
+                      <a:noFill/>
+                      <a:prstDash val="solid"/>
+                    </a:lnTlToBr>
+                    <a:lnBlToTr w="12700" cmpd="sng">
+                      <a:noFill/>
+                      <a:prstDash val="solid"/>
+                    </a:lnBlToTr>
+                    <a:noFill/>
+                  </a:tcPr>
+                </a:tc>
+                <a:tc>
+                  <a:txBody>
+                    <a:bodyPr/>
+                    <a:lstStyle/>
+                    <a:p>
+                      <a:pPr algn="ctr" latinLnBrk="1"/>
+                      <a:r>
+                        <a:rPr lang="en-US" altLang="ko-KR" sz="2400" b="0" dirty="0">
+                          <a:solidFill>
+                            <a:schemeClr val="tx1"/>
+                          </a:solidFill>
+                          <a:latin typeface="Noto Sans CJK KR Bold" panose="020B0800000000000000" pitchFamily="34" charset="-127"/>
+                          <a:ea typeface="Noto Sans CJK KR Bold" panose="020B0800000000000000" pitchFamily="34" charset="-127"/>
+                        </a:rPr>
+                        <a:t>GUI</a:t>
+                      </a:r>
+                    </a:p>
+                  </a:txBody>
+                  <a:tcPr>
+                    <a:lnL w="28575" cap="flat" cmpd="sng" algn="ctr">
+                      <a:solidFill>
+                        <a:srgbClr val="E4650E"/>
+                      </a:solidFill>
+                      <a:prstDash val="solid"/>
+                      <a:round/>
+                      <a:headEnd type="none" w="med" len="med"/>
+                      <a:tailEnd type="none" w="med" len="med"/>
+                    </a:lnL>
+                    <a:lnR w="28575" cap="flat" cmpd="sng" algn="ctr">
+                      <a:solidFill>
+                        <a:srgbClr val="E4650E"/>
+                      </a:solidFill>
+                      <a:prstDash val="solid"/>
+                      <a:round/>
+                      <a:headEnd type="none" w="med" len="med"/>
+                      <a:tailEnd type="none" w="med" len="med"/>
+                    </a:lnR>
+                    <a:lnT w="12700" cmpd="sng">
+                      <a:noFill/>
+                    </a:lnT>
+                    <a:lnB w="38100" cmpd="sng">
+                      <a:noFill/>
+                    </a:lnB>
+                    <a:lnTlToBr w="12700" cmpd="sng">
+                      <a:noFill/>
+                      <a:prstDash val="solid"/>
+                    </a:lnTlToBr>
+                    <a:lnBlToTr w="12700" cmpd="sng">
+                      <a:noFill/>
+                      <a:prstDash val="solid"/>
+                    </a:lnBlToTr>
+                    <a:noFill/>
+                  </a:tcPr>
+                </a:tc>
+                <a:tc>
+                  <a:txBody>
+                    <a:bodyPr/>
+                    <a:lstStyle/>
+                    <a:p>
+                      <a:pPr algn="ctr" latinLnBrk="1"/>
+                      <a:endParaRPr lang="en-US" altLang="ko-KR" sz="2400" b="0" dirty="0">
+                        <a:solidFill>
+                          <a:schemeClr val="tx1"/>
+                        </a:solidFill>
+                        <a:latin typeface="Noto Sans CJK KR Bold" panose="020B0800000000000000" pitchFamily="34" charset="-127"/>
+                        <a:ea typeface="Noto Sans CJK KR Bold" panose="020B0800000000000000" pitchFamily="34" charset="-127"/>
+                      </a:endParaRPr>
+                    </a:p>
+                  </a:txBody>
+                  <a:tcPr>
+                    <a:lnL w="28575" cap="flat" cmpd="sng" algn="ctr">
+                      <a:solidFill>
+                        <a:srgbClr val="E4650E"/>
+                      </a:solidFill>
+                      <a:prstDash val="solid"/>
+                      <a:round/>
+                      <a:headEnd type="none" w="med" len="med"/>
+                      <a:tailEnd type="none" w="med" len="med"/>
+                    </a:lnL>
+                    <a:lnR w="12700" cmpd="sng">
+                      <a:noFill/>
+                    </a:lnR>
+                    <a:lnT w="12700" cmpd="sng">
+                      <a:noFill/>
+                    </a:lnT>
+                    <a:lnB w="38100" cmpd="sng">
+                      <a:noFill/>
+                    </a:lnB>
+                    <a:lnTlToBr w="12700" cmpd="sng">
+                      <a:noFill/>
+                      <a:prstDash val="solid"/>
+                    </a:lnTlToBr>
+                    <a:lnBlToTr w="12700" cmpd="sng">
+                      <a:noFill/>
+                      <a:prstDash val="solid"/>
+                    </a:lnBlToTr>
+                    <a:noFill/>
+                  </a:tcPr>
+                </a:tc>
+                <a:extLst>
+                  <a:ext uri="{0D108BD9-81ED-4DB2-BD59-A6C34878D82A}">
+                    <a16:rowId xmlns:a16="http://schemas.microsoft.com/office/drawing/2014/main" val="1879273261"/>
+                  </a:ext>
+                </a:extLst>
+              </a:tr>
+              <a:tr h="441409">
+                <a:tc>
+                  <a:txBody>
+                    <a:bodyPr/>
+                    <a:lstStyle/>
+                    <a:p>
+                      <a:pPr marL="0" marR="0" lvl="0" indent="0" algn="ctr" defTabSz="914400" rtl="0" eaLnBrk="1" fontAlgn="auto" latinLnBrk="1" hangingPunct="1">
+                        <a:lnSpc>
+                          <a:spcPct val="100000"/>
+                        </a:lnSpc>
+                        <a:spcBef>
+                          <a:spcPts val="0"/>
+                        </a:spcBef>
+                        <a:spcAft>
+                          <a:spcPts val="0"/>
+                        </a:spcAft>
+                        <a:buClrTx/>
+                        <a:buSzTx/>
+                        <a:buFontTx/>
+                        <a:buNone/>
+                        <a:tabLst/>
+                        <a:defRPr/>
+                      </a:pPr>
+                      <a:r>
+                        <a:rPr lang="en-US" altLang="ko-KR" sz="2400" b="0" dirty="0">
+                          <a:solidFill>
+                            <a:schemeClr val="tx1"/>
+                          </a:solidFill>
+                          <a:latin typeface="Noto Sans CJK KR Bold" panose="020B0800000000000000" pitchFamily="34" charset="-127"/>
+                          <a:ea typeface="Noto Sans CJK KR Bold" panose="020B0800000000000000" pitchFamily="34" charset="-127"/>
+                        </a:rPr>
+                        <a:t>HashMap + CSV</a:t>
+                      </a:r>
+                      <a:endParaRPr lang="ko-KR" altLang="en-US" sz="2400" b="0" dirty="0">
+                        <a:solidFill>
+                          <a:schemeClr val="tx1"/>
+                        </a:solidFill>
+                        <a:latin typeface="Noto Sans CJK KR Bold" panose="020B0800000000000000" pitchFamily="34" charset="-127"/>
+                        <a:ea typeface="Noto Sans CJK KR Bold" panose="020B0800000000000000" pitchFamily="34" charset="-127"/>
+                      </a:endParaRPr>
+                    </a:p>
+                  </a:txBody>
+                  <a:tcPr>
+                    <a:lnL w="12700" cmpd="sng">
+                      <a:noFill/>
+                    </a:lnL>
+                    <a:lnR w="28575" cap="flat" cmpd="sng" algn="ctr">
+                      <a:solidFill>
+                        <a:srgbClr val="E4650E"/>
+                      </a:solidFill>
+                      <a:prstDash val="solid"/>
+                      <a:round/>
+                      <a:headEnd type="none" w="med" len="med"/>
+                      <a:tailEnd type="none" w="med" len="med"/>
+                    </a:lnR>
+                    <a:lnT w="12700" cmpd="sng">
+                      <a:noFill/>
+                    </a:lnT>
+                    <a:lnB w="38100" cmpd="sng">
+                      <a:noFill/>
+                    </a:lnB>
+                    <a:lnTlToBr w="12700" cmpd="sng">
+                      <a:noFill/>
+                      <a:prstDash val="solid"/>
+                    </a:lnTlToBr>
+                    <a:lnBlToTr w="12700" cmpd="sng">
+                      <a:noFill/>
+                      <a:prstDash val="solid"/>
+                    </a:lnBlToTr>
+                    <a:noFill/>
+                  </a:tcPr>
+                </a:tc>
+                <a:tc>
+                  <a:txBody>
+                    <a:bodyPr/>
+                    <a:lstStyle/>
+                    <a:p>
+                      <a:pPr marL="0" marR="0" lvl="0" indent="0" algn="ctr" defTabSz="914400" rtl="0" eaLnBrk="1" fontAlgn="auto" latinLnBrk="1" hangingPunct="1">
+                        <a:lnSpc>
+                          <a:spcPct val="100000"/>
+                        </a:lnSpc>
+                        <a:spcBef>
+                          <a:spcPts val="0"/>
+                        </a:spcBef>
+                        <a:spcAft>
+                          <a:spcPts val="0"/>
+                        </a:spcAft>
+                        <a:buClrTx/>
+                        <a:buSzTx/>
+                        <a:buFontTx/>
+                        <a:buNone/>
+                        <a:tabLst/>
+                        <a:defRPr/>
+                      </a:pPr>
+                      <a:r>
+                        <a:rPr lang="en-US" altLang="ko-KR" sz="2400" b="0" dirty="0">
+                          <a:solidFill>
+                            <a:schemeClr val="tx1"/>
+                          </a:solidFill>
+                          <a:latin typeface="Noto Sans CJK KR Bold" panose="020B0800000000000000" pitchFamily="34" charset="-127"/>
+                          <a:ea typeface="Noto Sans CJK KR Bold" panose="020B0800000000000000" pitchFamily="34" charset="-127"/>
+                        </a:rPr>
+                        <a:t>Swing </a:t>
+                      </a:r>
+                      <a:r>
+                        <a:rPr lang="ko-KR" altLang="en-US" sz="2400" b="0" dirty="0">
+                          <a:solidFill>
+                            <a:schemeClr val="tx1"/>
+                          </a:solidFill>
+                          <a:latin typeface="Noto Sans CJK KR Bold" panose="020B0800000000000000" pitchFamily="34" charset="-127"/>
+                          <a:ea typeface="Noto Sans CJK KR Bold" panose="020B0800000000000000" pitchFamily="34" charset="-127"/>
+                        </a:rPr>
+                        <a:t>라이브러리</a:t>
+                      </a:r>
+                    </a:p>
+                  </a:txBody>
+                  <a:tcPr>
+                    <a:lnL w="28575" cap="flat" cmpd="sng" algn="ctr">
+                      <a:solidFill>
+                        <a:srgbClr val="E4650E"/>
+                      </a:solidFill>
+                      <a:prstDash val="solid"/>
+                      <a:round/>
+                      <a:headEnd type="none" w="med" len="med"/>
+                      <a:tailEnd type="none" w="med" len="med"/>
+                    </a:lnL>
+                    <a:lnR w="28575" cap="flat" cmpd="sng" algn="ctr">
+                      <a:solidFill>
+                        <a:srgbClr val="E4650E"/>
+                      </a:solidFill>
+                      <a:prstDash val="solid"/>
+                      <a:round/>
+                      <a:headEnd type="none" w="med" len="med"/>
+                      <a:tailEnd type="none" w="med" len="med"/>
+                    </a:lnR>
+                    <a:lnT w="12700" cmpd="sng">
+                      <a:noFill/>
+                    </a:lnT>
+                    <a:lnB w="38100" cmpd="sng">
+                      <a:noFill/>
+                    </a:lnB>
+                    <a:lnTlToBr w="12700" cmpd="sng">
+                      <a:noFill/>
+                      <a:prstDash val="solid"/>
+                    </a:lnTlToBr>
+                    <a:lnBlToTr w="12700" cmpd="sng">
+                      <a:noFill/>
+                      <a:prstDash val="solid"/>
+                    </a:lnBlToTr>
+                    <a:noFill/>
+                  </a:tcPr>
+                </a:tc>
+                <a:tc>
+                  <a:txBody>
+                    <a:bodyPr/>
+                    <a:lstStyle/>
+                    <a:p>
+                      <a:pPr marL="0" marR="0" lvl="0" indent="0" algn="ctr" defTabSz="914400" rtl="0" eaLnBrk="1" fontAlgn="auto" latinLnBrk="1" hangingPunct="1">
+                        <a:lnSpc>
+                          <a:spcPct val="100000"/>
+                        </a:lnSpc>
+                        <a:spcBef>
+                          <a:spcPts val="0"/>
+                        </a:spcBef>
+                        <a:spcAft>
+                          <a:spcPts val="0"/>
+                        </a:spcAft>
+                        <a:buClrTx/>
+                        <a:buSzTx/>
+                        <a:buFontTx/>
+                        <a:buNone/>
+                        <a:tabLst/>
+                        <a:defRPr/>
+                      </a:pPr>
+                      <a:endParaRPr lang="ko-KR" altLang="en-US" sz="2400" b="0" dirty="0">
+                        <a:solidFill>
+                          <a:schemeClr val="tx1"/>
+                        </a:solidFill>
+                        <a:latin typeface="Noto Sans CJK KR Bold" panose="020B0800000000000000" pitchFamily="34" charset="-127"/>
+                        <a:ea typeface="Noto Sans CJK KR Bold" panose="020B0800000000000000" pitchFamily="34" charset="-127"/>
+                      </a:endParaRPr>
+                    </a:p>
+                  </a:txBody>
+                  <a:tcPr>
+                    <a:lnL w="28575" cap="flat" cmpd="sng" algn="ctr">
+                      <a:solidFill>
+                        <a:srgbClr val="E4650E"/>
+                      </a:solidFill>
+                      <a:prstDash val="solid"/>
+                      <a:round/>
+                      <a:headEnd type="none" w="med" len="med"/>
+                      <a:tailEnd type="none" w="med" len="med"/>
+                    </a:lnL>
+                    <a:lnR w="12700" cmpd="sng">
+                      <a:noFill/>
+                    </a:lnR>
+                    <a:lnT w="12700" cmpd="sng">
+                      <a:noFill/>
+                    </a:lnT>
+                    <a:lnB w="38100" cmpd="sng">
+                      <a:noFill/>
+                    </a:lnB>
+                    <a:lnTlToBr w="12700" cmpd="sng">
+                      <a:noFill/>
+                      <a:prstDash val="solid"/>
+                    </a:lnTlToBr>
+                    <a:lnBlToTr w="12700" cmpd="sng">
+                      <a:noFill/>
+                      <a:prstDash val="solid"/>
+                    </a:lnBlToTr>
+                    <a:noFill/>
+                  </a:tcPr>
+                </a:tc>
+                <a:extLst>
+                  <a:ext uri="{0D108BD9-81ED-4DB2-BD59-A6C34878D82A}">
+                    <a16:rowId xmlns:a16="http://schemas.microsoft.com/office/drawing/2014/main" val="4254823825"/>
+                  </a:ext>
+                </a:extLst>
+              </a:tr>
+            </a:tbl>
+          </a:graphicData>
+        </a:graphic>
+      </p:graphicFrame>
     </p:spTree>
     <p:extLst>
       <p:ext uri="{BB962C8B-B14F-4D97-AF65-F5344CB8AC3E}">
         <p14:creationId xmlns:p14="http://schemas.microsoft.com/office/powerpoint/2010/main" val="3007536971"/>
+      </p:ext>
+    </p:extLst>
+  </p:cSld>
+  <p:clrMapOvr>
+    <a:masterClrMapping/>
+  </p:clrMapOvr>
+</p:sld>
+</file>
+
+<file path=ppt/slides/slide7.xml><?xml version="1.0" encoding="utf-8"?>
+<p:sld xmlns:a="http://schemas.openxmlformats.org/drawingml/2006/main" xmlns:r="http://schemas.openxmlformats.org/officeDocument/2006/relationships" xmlns:p="http://schemas.openxmlformats.org/presentationml/2006/main">
+  <p:cSld>
+    <p:spTree>
+      <p:nvGrpSpPr>
+        <p:cNvPr id="1" name=""/>
+        <p:cNvGrpSpPr/>
+        <p:nvPr/>
+      </p:nvGrpSpPr>
+      <p:grpSpPr>
+        <a:xfrm>
+          <a:off x="0" y="0"/>
+          <a:ext cx="0" cy="0"/>
+          <a:chOff x="0" y="0"/>
+          <a:chExt cx="0" cy="0"/>
+        </a:xfrm>
+      </p:grpSpPr>
+      <p:graphicFrame>
+        <p:nvGraphicFramePr>
+          <p:cNvPr id="4" name="표 3">
+            <a:extLst>
+              <a:ext uri="{FF2B5EF4-FFF2-40B4-BE49-F238E27FC236}">
+                <a16:creationId xmlns:a16="http://schemas.microsoft.com/office/drawing/2014/main" id="{291F5426-E872-40B8-F03C-AA8EFB8C660A}"/>
+              </a:ext>
+            </a:extLst>
+          </p:cNvPr>
+          <p:cNvGraphicFramePr>
+            <a:graphicFrameLocks noGrp="1"/>
+          </p:cNvGraphicFramePr>
+          <p:nvPr>
+            <p:extLst>
+              <p:ext uri="{D42A27DB-BD31-4B8C-83A1-F6EECF244321}">
+                <p14:modId xmlns:p14="http://schemas.microsoft.com/office/powerpoint/2010/main" val="3815564878"/>
+              </p:ext>
+            </p:extLst>
+          </p:nvPr>
+        </p:nvGraphicFramePr>
+        <p:xfrm>
+          <a:off x="0" y="0"/>
+          <a:ext cx="12192004" cy="365760"/>
+        </p:xfrm>
+        <a:graphic>
+          <a:graphicData uri="http://schemas.openxmlformats.org/drawingml/2006/table">
+            <a:tbl>
+              <a:tblPr firstRow="1" bandRow="1">
+                <a:tableStyleId>{5C22544A-7EE6-4342-B048-85BDC9FD1C3A}</a:tableStyleId>
+              </a:tblPr>
+              <a:tblGrid>
+                <a:gridCol w="3048001">
+                  <a:extLst>
+                    <a:ext uri="{9D8B030D-6E8A-4147-A177-3AD203B41FA5}">
+                      <a16:colId xmlns:a16="http://schemas.microsoft.com/office/drawing/2014/main" val="2897943366"/>
+                    </a:ext>
+                  </a:extLst>
+                </a:gridCol>
+                <a:gridCol w="3048001">
+                  <a:extLst>
+                    <a:ext uri="{9D8B030D-6E8A-4147-A177-3AD203B41FA5}">
+                      <a16:colId xmlns:a16="http://schemas.microsoft.com/office/drawing/2014/main" val="3476757448"/>
+                    </a:ext>
+                  </a:extLst>
+                </a:gridCol>
+                <a:gridCol w="3048001">
+                  <a:extLst>
+                    <a:ext uri="{9D8B030D-6E8A-4147-A177-3AD203B41FA5}">
+                      <a16:colId xmlns:a16="http://schemas.microsoft.com/office/drawing/2014/main" val="2093659269"/>
+                    </a:ext>
+                  </a:extLst>
+                </a:gridCol>
+                <a:gridCol w="3048001">
+                  <a:extLst>
+                    <a:ext uri="{9D8B030D-6E8A-4147-A177-3AD203B41FA5}">
+                      <a16:colId xmlns:a16="http://schemas.microsoft.com/office/drawing/2014/main" val="1447057663"/>
+                    </a:ext>
+                  </a:extLst>
+                </a:gridCol>
+              </a:tblGrid>
+              <a:tr h="243281">
+                <a:tc>
+                  <a:txBody>
+                    <a:bodyPr/>
+                    <a:lstStyle/>
+                    <a:p>
+                      <a:pPr latinLnBrk="1"/>
+                      <a:endParaRPr lang="ko-KR" altLang="en-US" dirty="0"/>
+                    </a:p>
+                  </a:txBody>
+                  <a:tcPr>
+                    <a:lnL w="12700" cmpd="sng">
+                      <a:noFill/>
+                    </a:lnL>
+                    <a:lnR w="28575" cap="flat" cmpd="sng" algn="ctr">
+                      <a:solidFill>
+                        <a:schemeClr val="bg1"/>
+                      </a:solidFill>
+                      <a:prstDash val="solid"/>
+                      <a:round/>
+                      <a:headEnd type="none" w="med" len="med"/>
+                      <a:tailEnd type="none" w="med" len="med"/>
+                    </a:lnR>
+                    <a:lnT w="12700" cmpd="sng">
+                      <a:noFill/>
+                    </a:lnT>
+                    <a:lnB w="38100" cmpd="sng">
+                      <a:noFill/>
+                    </a:lnB>
+                    <a:lnTlToBr w="12700" cmpd="sng">
+                      <a:noFill/>
+                      <a:prstDash val="solid"/>
+                    </a:lnTlToBr>
+                    <a:lnBlToTr w="12700" cmpd="sng">
+                      <a:noFill/>
+                      <a:prstDash val="solid"/>
+                    </a:lnBlToTr>
+                  </a:tcPr>
+                </a:tc>
+                <a:tc>
+                  <a:txBody>
+                    <a:bodyPr/>
+                    <a:lstStyle/>
+                    <a:p>
+                      <a:pPr latinLnBrk="1"/>
+                      <a:endParaRPr lang="ko-KR" altLang="en-US" dirty="0"/>
+                    </a:p>
+                  </a:txBody>
+                  <a:tcPr>
+                    <a:lnL w="28575" cap="flat" cmpd="sng" algn="ctr">
+                      <a:solidFill>
+                        <a:schemeClr val="bg1"/>
+                      </a:solidFill>
+                      <a:prstDash val="solid"/>
+                      <a:round/>
+                      <a:headEnd type="none" w="med" len="med"/>
+                      <a:tailEnd type="none" w="med" len="med"/>
+                    </a:lnL>
+                    <a:lnR w="28575" cap="flat" cmpd="sng" algn="ctr">
+                      <a:solidFill>
+                        <a:schemeClr val="bg1"/>
+                      </a:solidFill>
+                      <a:prstDash val="solid"/>
+                      <a:round/>
+                      <a:headEnd type="none" w="med" len="med"/>
+                      <a:tailEnd type="none" w="med" len="med"/>
+                    </a:lnR>
+                    <a:lnT w="12700" cmpd="sng">
+                      <a:noFill/>
+                    </a:lnT>
+                    <a:lnB w="38100" cmpd="sng">
+                      <a:noFill/>
+                    </a:lnB>
+                    <a:lnTlToBr w="12700" cmpd="sng">
+                      <a:noFill/>
+                      <a:prstDash val="solid"/>
+                    </a:lnTlToBr>
+                    <a:lnBlToTr w="12700" cmpd="sng">
+                      <a:noFill/>
+                      <a:prstDash val="solid"/>
+                    </a:lnBlToTr>
+                    <a:solidFill>
+                      <a:srgbClr val="E4650E"/>
+                    </a:solidFill>
+                  </a:tcPr>
+                </a:tc>
+                <a:tc>
+                  <a:txBody>
+                    <a:bodyPr/>
+                    <a:lstStyle/>
+                    <a:p>
+                      <a:pPr latinLnBrk="1"/>
+                      <a:endParaRPr lang="ko-KR" altLang="en-US" dirty="0"/>
+                    </a:p>
+                  </a:txBody>
+                  <a:tcPr>
+                    <a:lnL w="28575" cap="flat" cmpd="sng" algn="ctr">
+                      <a:solidFill>
+                        <a:schemeClr val="bg1"/>
+                      </a:solidFill>
+                      <a:prstDash val="solid"/>
+                      <a:round/>
+                      <a:headEnd type="none" w="med" len="med"/>
+                      <a:tailEnd type="none" w="med" len="med"/>
+                    </a:lnL>
+                    <a:lnR w="28575" cap="flat" cmpd="sng" algn="ctr">
+                      <a:solidFill>
+                        <a:schemeClr val="bg1"/>
+                      </a:solidFill>
+                      <a:prstDash val="solid"/>
+                      <a:round/>
+                      <a:headEnd type="none" w="med" len="med"/>
+                      <a:tailEnd type="none" w="med" len="med"/>
+                    </a:lnR>
+                    <a:lnT w="12700" cmpd="sng">
+                      <a:noFill/>
+                    </a:lnT>
+                    <a:lnB w="38100" cmpd="sng">
+                      <a:noFill/>
+                    </a:lnB>
+                    <a:lnTlToBr w="12700" cmpd="sng">
+                      <a:noFill/>
+                      <a:prstDash val="solid"/>
+                    </a:lnTlToBr>
+                    <a:lnBlToTr w="12700" cmpd="sng">
+                      <a:noFill/>
+                      <a:prstDash val="solid"/>
+                    </a:lnBlToTr>
+                    <a:solidFill>
+                      <a:schemeClr val="bg1">
+                        <a:lumMod val="85000"/>
+                      </a:schemeClr>
+                    </a:solidFill>
+                  </a:tcPr>
+                </a:tc>
+                <a:tc>
+                  <a:txBody>
+                    <a:bodyPr/>
+                    <a:lstStyle/>
+                    <a:p>
+                      <a:pPr latinLnBrk="1"/>
+                      <a:endParaRPr lang="ko-KR" altLang="en-US" dirty="0"/>
+                    </a:p>
+                  </a:txBody>
+                  <a:tcPr>
+                    <a:lnL w="28575" cap="flat" cmpd="sng" algn="ctr">
+                      <a:solidFill>
+                        <a:schemeClr val="bg1"/>
+                      </a:solidFill>
+                      <a:prstDash val="solid"/>
+                      <a:round/>
+                      <a:headEnd type="none" w="med" len="med"/>
+                      <a:tailEnd type="none" w="med" len="med"/>
+                    </a:lnL>
+                    <a:lnR w="12700" cmpd="sng">
+                      <a:noFill/>
+                    </a:lnR>
+                    <a:lnT w="12700" cmpd="sng">
+                      <a:noFill/>
+                    </a:lnT>
+                    <a:lnB w="38100" cmpd="sng">
+                      <a:noFill/>
+                    </a:lnB>
+                    <a:lnTlToBr w="12700" cmpd="sng">
+                      <a:noFill/>
+                      <a:prstDash val="solid"/>
+                    </a:lnTlToBr>
+                    <a:lnBlToTr w="12700" cmpd="sng">
+                      <a:noFill/>
+                      <a:prstDash val="solid"/>
+                    </a:lnBlToTr>
+                    <a:solidFill>
+                      <a:schemeClr val="bg1">
+                        <a:lumMod val="85000"/>
+                      </a:schemeClr>
+                    </a:solidFill>
+                  </a:tcPr>
+                </a:tc>
+                <a:extLst>
+                  <a:ext uri="{0D108BD9-81ED-4DB2-BD59-A6C34878D82A}">
+                    <a16:rowId xmlns:a16="http://schemas.microsoft.com/office/drawing/2014/main" val="3765831902"/>
+                  </a:ext>
+                </a:extLst>
+              </a:tr>
+            </a:tbl>
+          </a:graphicData>
+        </a:graphic>
+      </p:graphicFrame>
+    </p:spTree>
+    <p:extLst>
+      <p:ext uri="{BB962C8B-B14F-4D97-AF65-F5344CB8AC3E}">
+        <p14:creationId xmlns:p14="http://schemas.microsoft.com/office/powerpoint/2010/main" val="1255980416"/>
       </p:ext>
     </p:extLst>
   </p:cSld>

</xml_diff>